<commit_message>
add thank you slide
</commit_message>
<xml_diff>
--- a/week12/branch.pptx
+++ b/week12/branch.pptx
@@ -7,6 +7,7 @@
   <p:sldIdLst>
     <p:sldId id="256" r:id="rId2"/>
     <p:sldId id="257" r:id="rId3"/>
+    <p:sldId id="258" r:id="rId4"/>
   </p:sldIdLst>
   <p:sldSz cx="12192000" cy="6858000"/>
   <p:notesSz cx="6858000" cy="9144000"/>
@@ -262,7 +263,7 @@
           <a:p>
             <a:fld id="{42AB81E2-2E7B-B344-9159-A676E4F74E42}" type="datetimeFigureOut">
               <a:rPr lang="en-KR" smtClean="0"/>
-              <a:t>11/16/23</a:t>
+              <a:t>11/17/2023</a:t>
             </a:fld>
             <a:endParaRPr lang="en-KR"/>
           </a:p>
@@ -462,7 +463,7 @@
           <a:p>
             <a:fld id="{42AB81E2-2E7B-B344-9159-A676E4F74E42}" type="datetimeFigureOut">
               <a:rPr lang="en-KR" smtClean="0"/>
-              <a:t>11/16/23</a:t>
+              <a:t>11/17/2023</a:t>
             </a:fld>
             <a:endParaRPr lang="en-KR"/>
           </a:p>
@@ -672,7 +673,7 @@
           <a:p>
             <a:fld id="{42AB81E2-2E7B-B344-9159-A676E4F74E42}" type="datetimeFigureOut">
               <a:rPr lang="en-KR" smtClean="0"/>
-              <a:t>11/16/23</a:t>
+              <a:t>11/17/2023</a:t>
             </a:fld>
             <a:endParaRPr lang="en-KR"/>
           </a:p>
@@ -872,7 +873,7 @@
           <a:p>
             <a:fld id="{42AB81E2-2E7B-B344-9159-A676E4F74E42}" type="datetimeFigureOut">
               <a:rPr lang="en-KR" smtClean="0"/>
-              <a:t>11/16/23</a:t>
+              <a:t>11/17/2023</a:t>
             </a:fld>
             <a:endParaRPr lang="en-KR"/>
           </a:p>
@@ -1148,7 +1149,7 @@
           <a:p>
             <a:fld id="{42AB81E2-2E7B-B344-9159-A676E4F74E42}" type="datetimeFigureOut">
               <a:rPr lang="en-KR" smtClean="0"/>
-              <a:t>11/16/23</a:t>
+              <a:t>11/17/2023</a:t>
             </a:fld>
             <a:endParaRPr lang="en-KR"/>
           </a:p>
@@ -1416,7 +1417,7 @@
           <a:p>
             <a:fld id="{42AB81E2-2E7B-B344-9159-A676E4F74E42}" type="datetimeFigureOut">
               <a:rPr lang="en-KR" smtClean="0"/>
-              <a:t>11/16/23</a:t>
+              <a:t>11/17/2023</a:t>
             </a:fld>
             <a:endParaRPr lang="en-KR"/>
           </a:p>
@@ -1831,7 +1832,7 @@
           <a:p>
             <a:fld id="{42AB81E2-2E7B-B344-9159-A676E4F74E42}" type="datetimeFigureOut">
               <a:rPr lang="en-KR" smtClean="0"/>
-              <a:t>11/16/23</a:t>
+              <a:t>11/17/2023</a:t>
             </a:fld>
             <a:endParaRPr lang="en-KR"/>
           </a:p>
@@ -1973,7 +1974,7 @@
           <a:p>
             <a:fld id="{42AB81E2-2E7B-B344-9159-A676E4F74E42}" type="datetimeFigureOut">
               <a:rPr lang="en-KR" smtClean="0"/>
-              <a:t>11/16/23</a:t>
+              <a:t>11/17/2023</a:t>
             </a:fld>
             <a:endParaRPr lang="en-KR"/>
           </a:p>
@@ -2086,7 +2087,7 @@
           <a:p>
             <a:fld id="{42AB81E2-2E7B-B344-9159-A676E4F74E42}" type="datetimeFigureOut">
               <a:rPr lang="en-KR" smtClean="0"/>
-              <a:t>11/16/23</a:t>
+              <a:t>11/17/2023</a:t>
             </a:fld>
             <a:endParaRPr lang="en-KR"/>
           </a:p>
@@ -2399,7 +2400,7 @@
           <a:p>
             <a:fld id="{42AB81E2-2E7B-B344-9159-A676E4F74E42}" type="datetimeFigureOut">
               <a:rPr lang="en-KR" smtClean="0"/>
-              <a:t>11/16/23</a:t>
+              <a:t>11/17/2023</a:t>
             </a:fld>
             <a:endParaRPr lang="en-KR"/>
           </a:p>
@@ -2688,7 +2689,7 @@
           <a:p>
             <a:fld id="{42AB81E2-2E7B-B344-9159-A676E4F74E42}" type="datetimeFigureOut">
               <a:rPr lang="en-KR" smtClean="0"/>
-              <a:t>11/16/23</a:t>
+              <a:t>11/17/2023</a:t>
             </a:fld>
             <a:endParaRPr lang="en-KR"/>
           </a:p>
@@ -2931,7 +2932,7 @@
           <a:p>
             <a:fld id="{42AB81E2-2E7B-B344-9159-A676E4F74E42}" type="datetimeFigureOut">
               <a:rPr lang="en-KR" smtClean="0"/>
-              <a:t>11/16/23</a:t>
+              <a:t>11/17/2023</a:t>
             </a:fld>
             <a:endParaRPr lang="en-KR"/>
           </a:p>
@@ -3802,6 +3803,84 @@
 </p:sld>
 </file>
 
+<file path=ppt/slides/slide3.xml><?xml version="1.0" encoding="utf-8"?>
+<p:sld xmlns:a="http://schemas.openxmlformats.org/drawingml/2006/main" xmlns:r="http://schemas.openxmlformats.org/officeDocument/2006/relationships" xmlns:p="http://schemas.openxmlformats.org/presentationml/2006/main">
+  <p:cSld>
+    <p:spTree>
+      <p:nvGrpSpPr>
+        <p:cNvPr id="1" name=""/>
+        <p:cNvGrpSpPr/>
+        <p:nvPr/>
+      </p:nvGrpSpPr>
+      <p:grpSpPr>
+        <a:xfrm>
+          <a:off x="0" y="0"/>
+          <a:ext cx="0" cy="0"/>
+          <a:chOff x="0" y="0"/>
+          <a:chExt cx="0" cy="0"/>
+        </a:xfrm>
+      </p:grpSpPr>
+      <p:sp>
+        <p:nvSpPr>
+          <p:cNvPr id="4" name="TextBox 3">
+            <a:extLst>
+              <a:ext uri="{FF2B5EF4-FFF2-40B4-BE49-F238E27FC236}">
+                <a16:creationId xmlns:a16="http://schemas.microsoft.com/office/drawing/2014/main" id="{906189A1-6A12-C9D8-FD42-4DA2C68208E5}"/>
+              </a:ext>
+            </a:extLst>
+          </p:cNvPr>
+          <p:cNvSpPr txBox="1"/>
+          <p:nvPr/>
+        </p:nvSpPr>
+        <p:spPr>
+          <a:xfrm>
+            <a:off x="3401785" y="2644170"/>
+            <a:ext cx="5388429" cy="1569660"/>
+          </a:xfrm>
+          <a:prstGeom prst="rect">
+            <a:avLst/>
+          </a:prstGeom>
+          <a:noFill/>
+        </p:spPr>
+        <p:txBody>
+          <a:bodyPr wrap="square" rtlCol="0">
+            <a:spAutoFit/>
+          </a:bodyPr>
+          <a:lstStyle/>
+          <a:p>
+            <a:r>
+              <a:rPr lang="en-US" altLang="ko-KR" sz="9600" dirty="0">
+                <a:solidFill>
+                  <a:schemeClr val="accent2">
+                    <a:lumMod val="75000"/>
+                  </a:schemeClr>
+                </a:solidFill>
+              </a:rPr>
+              <a:t>Thank you</a:t>
+            </a:r>
+            <a:endParaRPr lang="ko-KR" altLang="en-US" sz="9600" dirty="0">
+              <a:solidFill>
+                <a:schemeClr val="accent2">
+                  <a:lumMod val="75000"/>
+                </a:schemeClr>
+              </a:solidFill>
+            </a:endParaRPr>
+          </a:p>
+        </p:txBody>
+      </p:sp>
+    </p:spTree>
+    <p:extLst>
+      <p:ext uri="{BB962C8B-B14F-4D97-AF65-F5344CB8AC3E}">
+        <p14:creationId xmlns:p14="http://schemas.microsoft.com/office/powerpoint/2010/main" val="462991280"/>
+      </p:ext>
+    </p:extLst>
+  </p:cSld>
+  <p:clrMapOvr>
+    <a:masterClrMapping/>
+  </p:clrMapOvr>
+</p:sld>
+</file>
+
 <file path=ppt/theme/theme1.xml><?xml version="1.0" encoding="utf-8"?>
 <a:theme xmlns:a="http://schemas.openxmlformats.org/drawingml/2006/main" name="Office Theme">
   <a:themeElements>

</xml_diff>